<commit_message>
check in ppt 1
</commit_message>
<xml_diff>
--- a/Demo/Vss ppt.pptx
+++ b/Demo/Vss ppt.pptx
@@ -2959,6 +2959,10 @@
           <a:bodyPr/>
           <a:lstStyle/>
           <a:p>
+            <a:r>
+              <a:rPr lang="en-US"/>
+              <a:t>migration</a:t>
+            </a:r>
             <a:endParaRPr lang="en-US"/>
           </a:p>
         </p:txBody>

</xml_diff>